<commit_message>
html for lecture #20
</commit_message>
<xml_diff>
--- a/classes/stats2017/Lecture20.pptx
+++ b/classes/stats2017/Lecture20.pptx
@@ -6483,8 +6483,8 @@
         </p:nvSpPr>
         <p:spPr>
           <a:xfrm>
-            <a:off x="990600" y="1447800"/>
-            <a:ext cx="6518387" cy="369332"/>
+            <a:off x="838200" y="1459468"/>
+            <a:ext cx="7765011" cy="369332"/>
           </a:xfrm>
           <a:prstGeom prst="rect">
             <a:avLst/>
@@ -6505,7 +6505,7 @@
               <a:rPr lang="en-US" dirty="0">
                 <a:sym typeface="Symbol"/>
               </a:rPr>
-              <a:t> = probability of a false zero </a:t>
+              <a:t> = probability of a false or “rounded” zero </a:t>
             </a:r>
             <a:endParaRPr lang="en-US" dirty="0"/>
           </a:p>
@@ -6585,8 +6585,8 @@
         </p:nvSpPr>
         <p:spPr>
           <a:xfrm>
-            <a:off x="2590800" y="3505200"/>
-            <a:ext cx="5696688" cy="369332"/>
+            <a:off x="228600" y="3429000"/>
+            <a:ext cx="8804654" cy="369332"/>
           </a:xfrm>
           <a:prstGeom prst="rect">
             <a:avLst/>
@@ -6601,12 +6601,13 @@
           <a:p>
             <a:r>
               <a:rPr lang="en-US" dirty="0"/>
-              <a:t>This will be either Poisson or Negative </a:t>
-            </a:r>
-            <a:r>
-              <a:rPr lang="en-US"/>
-              <a:t>Binomial distributed</a:t>
-            </a:r>
+              <a:t>This will be either Poisson or Negative Binomial distributed of the true or “essential” </a:t>
+            </a:r>
+            <a:r>
+              <a:rPr lang="en-US" dirty="0" err="1"/>
+              <a:t>zeors</a:t>
+            </a:r>
+            <a:endParaRPr lang="en-US" dirty="0"/>
           </a:p>
         </p:txBody>
       </p:sp>
@@ -6627,7 +6628,7 @@
         </p:blipFill>
         <p:spPr bwMode="auto">
           <a:xfrm>
-            <a:off x="1828800" y="5219700"/>
+            <a:off x="1828800" y="5257800"/>
             <a:ext cx="3600450" cy="800100"/>
           </a:xfrm>
           <a:prstGeom prst="rect">
@@ -6878,7 +6879,7 @@
         <p:spPr>
           <a:xfrm>
             <a:off x="990600" y="152400"/>
-            <a:ext cx="7086600" cy="369332"/>
+            <a:ext cx="7086600" cy="646331"/>
           </a:xfrm>
           <a:prstGeom prst="rect">
             <a:avLst/>
@@ -6890,6 +6891,10 @@
           </a:bodyPr>
           <a:lstStyle/>
           <a:p>
+            <a:r>
+              <a:rPr lang="en-US" dirty="0"/>
+              <a:t>Zero-inflated models use </a:t>
+            </a:r>
             <a:r>
               <a:rPr lang="en-US" dirty="0">
                 <a:solidFill>
@@ -6900,7 +6905,7 @@
             </a:r>
             <a:r>
               <a:rPr lang="en-US" dirty="0"/>
-              <a:t> that explicitly model the over-abundance of zeros</a:t>
+              <a:t> to explicitly model the over-abundance of zeros</a:t>
             </a:r>
           </a:p>
         </p:txBody>

</xml_diff>